<commit_message>
Primeira versao do capitulo do modelo de estimacao dos juros da divida tecnica
</commit_message>
<xml_diff>
--- a/figuras/capitulo_metodo/NiveisDeAbstracoesModelo.pptx
+++ b/figuras/capitulo_metodo/NiveisDeAbstracoesModelo.pptx
@@ -4974,7 +4974,7 @@
           <a:p>
             <a:fld id="{5C41425B-0325-4D9F-855B-C4F392D94954}" type="datetimeFigureOut">
               <a:rPr lang="en-US" smtClean="0"/>
-              <a:t>2/6/2019</a:t>
+              <a:t>3/19/2019</a:t>
             </a:fld>
             <a:endParaRPr lang="en-US"/>
           </a:p>
@@ -5174,7 +5174,7 @@
           <a:p>
             <a:fld id="{5C41425B-0325-4D9F-855B-C4F392D94954}" type="datetimeFigureOut">
               <a:rPr lang="en-US" smtClean="0"/>
-              <a:t>2/6/2019</a:t>
+              <a:t>3/19/2019</a:t>
             </a:fld>
             <a:endParaRPr lang="en-US"/>
           </a:p>
@@ -5384,7 +5384,7 @@
           <a:p>
             <a:fld id="{5C41425B-0325-4D9F-855B-C4F392D94954}" type="datetimeFigureOut">
               <a:rPr lang="en-US" smtClean="0"/>
-              <a:t>2/6/2019</a:t>
+              <a:t>3/19/2019</a:t>
             </a:fld>
             <a:endParaRPr lang="en-US"/>
           </a:p>
@@ -5584,7 +5584,7 @@
           <a:p>
             <a:fld id="{5C41425B-0325-4D9F-855B-C4F392D94954}" type="datetimeFigureOut">
               <a:rPr lang="en-US" smtClean="0"/>
-              <a:t>2/6/2019</a:t>
+              <a:t>3/19/2019</a:t>
             </a:fld>
             <a:endParaRPr lang="en-US"/>
           </a:p>
@@ -5860,7 +5860,7 @@
           <a:p>
             <a:fld id="{5C41425B-0325-4D9F-855B-C4F392D94954}" type="datetimeFigureOut">
               <a:rPr lang="en-US" smtClean="0"/>
-              <a:t>2/6/2019</a:t>
+              <a:t>3/19/2019</a:t>
             </a:fld>
             <a:endParaRPr lang="en-US"/>
           </a:p>
@@ -6128,7 +6128,7 @@
           <a:p>
             <a:fld id="{5C41425B-0325-4D9F-855B-C4F392D94954}" type="datetimeFigureOut">
               <a:rPr lang="en-US" smtClean="0"/>
-              <a:t>2/6/2019</a:t>
+              <a:t>3/19/2019</a:t>
             </a:fld>
             <a:endParaRPr lang="en-US"/>
           </a:p>
@@ -6543,7 +6543,7 @@
           <a:p>
             <a:fld id="{5C41425B-0325-4D9F-855B-C4F392D94954}" type="datetimeFigureOut">
               <a:rPr lang="en-US" smtClean="0"/>
-              <a:t>2/6/2019</a:t>
+              <a:t>3/19/2019</a:t>
             </a:fld>
             <a:endParaRPr lang="en-US"/>
           </a:p>
@@ -6685,7 +6685,7 @@
           <a:p>
             <a:fld id="{5C41425B-0325-4D9F-855B-C4F392D94954}" type="datetimeFigureOut">
               <a:rPr lang="en-US" smtClean="0"/>
-              <a:t>2/6/2019</a:t>
+              <a:t>3/19/2019</a:t>
             </a:fld>
             <a:endParaRPr lang="en-US"/>
           </a:p>
@@ -6798,7 +6798,7 @@
           <a:p>
             <a:fld id="{5C41425B-0325-4D9F-855B-C4F392D94954}" type="datetimeFigureOut">
               <a:rPr lang="en-US" smtClean="0"/>
-              <a:t>2/6/2019</a:t>
+              <a:t>3/19/2019</a:t>
             </a:fld>
             <a:endParaRPr lang="en-US"/>
           </a:p>
@@ -7111,7 +7111,7 @@
           <a:p>
             <a:fld id="{5C41425B-0325-4D9F-855B-C4F392D94954}" type="datetimeFigureOut">
               <a:rPr lang="en-US" smtClean="0"/>
-              <a:t>2/6/2019</a:t>
+              <a:t>3/19/2019</a:t>
             </a:fld>
             <a:endParaRPr lang="en-US"/>
           </a:p>
@@ -7400,7 +7400,7 @@
           <a:p>
             <a:fld id="{5C41425B-0325-4D9F-855B-C4F392D94954}" type="datetimeFigureOut">
               <a:rPr lang="en-US" smtClean="0"/>
-              <a:t>2/6/2019</a:t>
+              <a:t>3/19/2019</a:t>
             </a:fld>
             <a:endParaRPr lang="en-US"/>
           </a:p>
@@ -7643,7 +7643,7 @@
           <a:p>
             <a:fld id="{5C41425B-0325-4D9F-855B-C4F392D94954}" type="datetimeFigureOut">
               <a:rPr lang="en-US" smtClean="0"/>
-              <a:t>2/6/2019</a:t>
+              <a:t>3/19/2019</a:t>
             </a:fld>
             <a:endParaRPr lang="en-US"/>
           </a:p>
@@ -8119,7 +8119,15 @@
             <a:pPr algn="ctr"/>
             <a:r>
               <a:rPr lang="pt-BR" sz="1200" dirty="0"/>
-              <a:t>Cada uma das instância utiliza as métricas de medição da produtividade e dívida técnica que sejam apropriadas para o tipo de projeto no qual o juros está sendo estimado.</a:t>
+              <a:t>Cada uma </a:t>
+            </a:r>
+            <a:r>
+              <a:rPr lang="pt-BR" sz="1200"/>
+              <a:t>das instâncias </a:t>
+            </a:r>
+            <a:r>
+              <a:rPr lang="pt-BR" sz="1200" dirty="0"/>
+              <a:t>utiliza as métricas de medição da produtividade e dívida técnica que sejam apropriadas para o tipo de projeto no qual o juros está sendo estimado.</a:t>
             </a:r>
           </a:p>
           <a:p>

</xml_diff>